<commit_message>
Added new version of Workload Assessment model to the public repository
</commit_message>
<xml_diff>
--- a/IP and Scripts/Data Workload Assessment Model and Tool/Workload Assessment Tools/Data Workload Assessment Model and Tool - Overview and Guidance - v3 - Embedded Tool.pptx
+++ b/IP and Scripts/Data Workload Assessment Model and Tool/Workload Assessment Tools/Data Workload Assessment Model and Tool - Overview and Guidance - v3 - Embedded Tool.pptx
@@ -245,7 +245,7 @@
               <a:rPr lang="en-US" smtClean="0">
                 <a:latin typeface="Segoe UI" pitchFamily="34" charset="0"/>
               </a:rPr>
-              <a:t>10/14/2020 11:15 AM</a:t>
+              <a:t>3/3/2021 7:52 AM</a:t>
             </a:fld>
             <a:endParaRPr lang="en-US" dirty="0">
               <a:latin typeface="Segoe UI" pitchFamily="34" charset="0"/>
@@ -539,7 +539,7 @@
           <a:p>
             <a:fld id="{D18B56EA-E28F-4F92-9F16-7A6F2501B303}" type="datetime8">
               <a:rPr lang="en-US" smtClean="0"/>
-              <a:t>10/14/2020 11:12 AM</a:t>
+              <a:t>3/3/2021 7:52 AM</a:t>
             </a:fld>
             <a:endParaRPr lang="en-US" dirty="0"/>
           </a:p>
@@ -868,7 +868,7 @@
           <a:p>
             <a:fld id="{56C2EDE2-D073-4F7E-A469-E134256712C5}" type="datetime8">
               <a:rPr lang="en-US" smtClean="0"/>
-              <a:t>10/14/2020 11:12 AM</a:t>
+              <a:t>3/3/2021 7:52 AM</a:t>
             </a:fld>
             <a:endParaRPr lang="en-US" dirty="0"/>
           </a:p>
@@ -1056,7 +1056,7 @@
           <a:p>
             <a:fld id="{26EED51F-96EB-4E4E-9B3B-EAE92F3CF0A4}" type="datetime8">
               <a:rPr lang="en-US" smtClean="0"/>
-              <a:t>10/14/2020 11:12 AM</a:t>
+              <a:t>3/3/2021 7:52 AM</a:t>
             </a:fld>
             <a:endParaRPr lang="en-US" dirty="0"/>
           </a:p>
@@ -1271,7 +1271,7 @@
           <a:p>
             <a:fld id="{26EED51F-96EB-4E4E-9B3B-EAE92F3CF0A4}" type="datetime8">
               <a:rPr lang="en-US" smtClean="0"/>
-              <a:t>10/14/2020 11:12 AM</a:t>
+              <a:t>3/3/2021 7:52 AM</a:t>
             </a:fld>
             <a:endParaRPr lang="en-US" dirty="0"/>
           </a:p>
@@ -1486,7 +1486,7 @@
           <a:p>
             <a:fld id="{26EED51F-96EB-4E4E-9B3B-EAE92F3CF0A4}" type="datetime8">
               <a:rPr lang="en-US" smtClean="0"/>
-              <a:t>10/14/2020 11:12 AM</a:t>
+              <a:t>3/3/2021 7:52 AM</a:t>
             </a:fld>
             <a:endParaRPr lang="en-US" dirty="0"/>
           </a:p>
@@ -1701,7 +1701,7 @@
           <a:p>
             <a:fld id="{26EED51F-96EB-4E4E-9B3B-EAE92F3CF0A4}" type="datetime8">
               <a:rPr lang="en-US" smtClean="0"/>
-              <a:t>10/14/2020 11:12 AM</a:t>
+              <a:t>3/3/2021 7:52 AM</a:t>
             </a:fld>
             <a:endParaRPr lang="en-US" dirty="0"/>
           </a:p>
@@ -1916,7 +1916,7 @@
           <a:p>
             <a:fld id="{26EED51F-96EB-4E4E-9B3B-EAE92F3CF0A4}" type="datetime8">
               <a:rPr lang="en-US" smtClean="0"/>
-              <a:t>10/14/2020 11:12 AM</a:t>
+              <a:t>3/3/2021 7:52 AM</a:t>
             </a:fld>
             <a:endParaRPr lang="en-US" dirty="0"/>
           </a:p>
@@ -2131,7 +2131,7 @@
           <a:p>
             <a:fld id="{26EED51F-96EB-4E4E-9B3B-EAE92F3CF0A4}" type="datetime8">
               <a:rPr lang="en-US" smtClean="0"/>
-              <a:t>10/14/2020 11:12 AM</a:t>
+              <a:t>3/3/2021 7:52 AM</a:t>
             </a:fld>
             <a:endParaRPr lang="en-US" dirty="0"/>
           </a:p>
@@ -11483,7 +11483,7 @@
         <p:spPr>
           <a:xfrm>
             <a:off x="274638" y="1341790"/>
-            <a:ext cx="8839199" cy="5112169"/>
+            <a:ext cx="8839199" cy="5349157"/>
           </a:xfrm>
         </p:spPr>
         <p:txBody>
@@ -11578,6 +11578,13 @@
             <a:r>
               <a:rPr lang="en-US" sz="1400" dirty="0"/>
               <a:t>Azure SQL Data Warehouse</a:t>
+            </a:r>
+          </a:p>
+          <a:p>
+            <a:pPr lvl="1"/>
+            <a:r>
+              <a:rPr lang="en-US" sz="1400" dirty="0"/>
+              <a:t>Azure SQL DB Hyperscale</a:t>
             </a:r>
           </a:p>
           <a:p>
@@ -19172,46 +19179,6 @@
           </a:p>
         </p:txBody>
       </p:sp>
-      <p:pic>
-        <p:nvPicPr>
-          <p:cNvPr id="4" name="Picture 3">
-            <a:extLst>
-              <a:ext uri="{FF2B5EF4-FFF2-40B4-BE49-F238E27FC236}">
-                <a16:creationId xmlns:a16="http://schemas.microsoft.com/office/drawing/2014/main" id="{53D487D4-5FFC-4D29-9807-F07D9F3FB191}"/>
-              </a:ext>
-            </a:extLst>
-          </p:cNvPr>
-          <p:cNvPicPr>
-            <a:picLocks noChangeAspect="1"/>
-          </p:cNvPicPr>
-          <p:nvPr/>
-        </p:nvPicPr>
-        <p:blipFill>
-          <a:blip r:embed="rId3"/>
-          <a:stretch>
-            <a:fillRect/>
-          </a:stretch>
-        </p:blipFill>
-        <p:spPr>
-          <a:xfrm>
-            <a:off x="359273" y="1668462"/>
-            <a:ext cx="11717928" cy="3896537"/>
-          </a:xfrm>
-          <a:prstGeom prst="rect">
-            <a:avLst/>
-          </a:prstGeom>
-          <a:ln>
-            <a:noFill/>
-          </a:ln>
-          <a:effectLst>
-            <a:outerShdw blurRad="292100" dist="139700" dir="2700000" algn="tl" rotWithShape="0">
-              <a:srgbClr val="333333">
-                <a:alpha val="65000"/>
-              </a:srgbClr>
-            </a:outerShdw>
-          </a:effectLst>
-        </p:spPr>
-      </p:pic>
       <p:sp>
         <p:nvSpPr>
           <p:cNvPr id="5" name="TextBox 4">
@@ -19280,6 +19247,46 @@
           </a:p>
         </p:txBody>
       </p:sp>
+      <p:pic>
+        <p:nvPicPr>
+          <p:cNvPr id="8" name="Picture 7">
+            <a:extLst>
+              <a:ext uri="{FF2B5EF4-FFF2-40B4-BE49-F238E27FC236}">
+                <a16:creationId xmlns:a16="http://schemas.microsoft.com/office/drawing/2014/main" id="{7D2FCC83-0991-4CCE-9A3F-FB22C7AD1381}"/>
+              </a:ext>
+            </a:extLst>
+          </p:cNvPr>
+          <p:cNvPicPr>
+            <a:picLocks noChangeAspect="1"/>
+          </p:cNvPicPr>
+          <p:nvPr/>
+        </p:nvPicPr>
+        <p:blipFill>
+          <a:blip r:embed="rId3"/>
+          <a:stretch>
+            <a:fillRect/>
+          </a:stretch>
+        </p:blipFill>
+        <p:spPr>
+          <a:xfrm>
+            <a:off x="0" y="2372186"/>
+            <a:ext cx="12436475" cy="2250153"/>
+          </a:xfrm>
+          <a:prstGeom prst="rect">
+            <a:avLst/>
+          </a:prstGeom>
+          <a:ln>
+            <a:noFill/>
+          </a:ln>
+          <a:effectLst>
+            <a:outerShdw blurRad="190500" algn="tl" rotWithShape="0">
+              <a:srgbClr val="000000">
+                <a:alpha val="70000"/>
+              </a:srgbClr>
+            </a:outerShdw>
+          </a:effectLst>
+        </p:spPr>
+      </p:pic>
     </p:spTree>
     <p:extLst>
       <p:ext uri="{BB962C8B-B14F-4D97-AF65-F5344CB8AC3E}">
@@ -20314,21 +20321,6 @@
 </file>
 
 <file path=customXml/item1.xml><?xml version="1.0" encoding="utf-8"?>
-<?mso-contentType ?>
-<FormTemplates xmlns="http://schemas.microsoft.com/sharepoint/v3/contenttype/forms">
-  <Display>DocumentLibraryForm</Display>
-  <Edit>DocumentLibraryForm</Edit>
-  <New>DocumentLibraryForm</New>
-</FormTemplates>
-</file>
-
-<file path=customXml/item2.xml><?xml version="1.0" encoding="utf-8"?>
-<p:properties xmlns:p="http://schemas.microsoft.com/office/2006/metadata/properties" xmlns:xsi="http://www.w3.org/2001/XMLSchema-instance" xmlns:pc="http://schemas.microsoft.com/office/infopath/2007/PartnerControls">
-  <documentManagement/>
-</p:properties>
-</file>
-
-<file path=customXml/item3.xml><?xml version="1.0" encoding="utf-8"?>
 <ct:contentTypeSchema xmlns:ct="http://schemas.microsoft.com/office/2006/metadata/contentType" xmlns:ma="http://schemas.microsoft.com/office/2006/metadata/properties/metaAttributes" ct:_="" ma:_="" ma:contentTypeName="Document" ma:contentTypeID="0x0101001663038BF9716642BCA9BEDEEEE991E8" ma:contentTypeVersion="10" ma:contentTypeDescription="Create a new document." ma:contentTypeScope="" ma:versionID="8c37f2265097ab2a1a8ca6511293cc18">
   <xsd:schema xmlns:xsd="http://www.w3.org/2001/XMLSchema" xmlns:xs="http://www.w3.org/2001/XMLSchema" xmlns:p="http://schemas.microsoft.com/office/2006/metadata/properties" xmlns:ns2="4053a332-7d8e-488d-aba6-ad6dfa6b0f2d" xmlns:ns3="6e4f6676-91ee-47a5-8164-c59c33586ba7" targetNamespace="http://schemas.microsoft.com/office/2006/metadata/properties" ma:root="true" ma:fieldsID="922c1d919ec7206f465f09fbb4121dee" ns2:_="" ns3:_="">
     <xsd:import namespace="4053a332-7d8e-488d-aba6-ad6dfa6b0f2d"/>
@@ -20533,10 +20525,36 @@
 </ct:contentTypeSchema>
 </file>
 
+<file path=customXml/item2.xml><?xml version="1.0" encoding="utf-8"?>
+<p:properties xmlns:p="http://schemas.microsoft.com/office/2006/metadata/properties" xmlns:xsi="http://www.w3.org/2001/XMLSchema-instance" xmlns:pc="http://schemas.microsoft.com/office/infopath/2007/PartnerControls">
+  <documentManagement/>
+</p:properties>
+</file>
+
+<file path=customXml/item3.xml><?xml version="1.0" encoding="utf-8"?>
+<?mso-contentType ?>
+<FormTemplates xmlns="http://schemas.microsoft.com/sharepoint/v3/contenttype/forms">
+  <Display>DocumentLibraryForm</Display>
+  <Edit>DocumentLibraryForm</Edit>
+  <New>DocumentLibraryForm</New>
+</FormTemplates>
+</file>
+
 <file path=customXml/itemProps1.xml><?xml version="1.0" encoding="utf-8"?>
-<ds:datastoreItem xmlns:ds="http://schemas.openxmlformats.org/officeDocument/2006/customXml" ds:itemID="{758FDAC0-319D-4A54-8D8E-1D42CB1F8004}">
+<ds:datastoreItem xmlns:ds="http://schemas.openxmlformats.org/officeDocument/2006/customXml" ds:itemID="{85338F74-B976-4101-955D-1A3C117F4A0E}">
   <ds:schemaRefs>
-    <ds:schemaRef ds:uri="http://schemas.microsoft.com/sharepoint/v3/contenttype/forms"/>
+    <ds:schemaRef ds:uri="http://schemas.microsoft.com/office/2006/metadata/contentType"/>
+    <ds:schemaRef ds:uri="http://schemas.microsoft.com/office/2006/metadata/properties/metaAttributes"/>
+    <ds:schemaRef ds:uri="http://www.w3.org/2001/XMLSchema"/>
+    <ds:schemaRef ds:uri="http://schemas.microsoft.com/office/2006/metadata/properties"/>
+    <ds:schemaRef ds:uri="4053a332-7d8e-488d-aba6-ad6dfa6b0f2d"/>
+    <ds:schemaRef ds:uri="6e4f6676-91ee-47a5-8164-c59c33586ba7"/>
+    <ds:schemaRef ds:uri="http://schemas.microsoft.com/office/2006/documentManagement/types"/>
+    <ds:schemaRef ds:uri="http://schemas.microsoft.com/office/infopath/2007/PartnerControls"/>
+    <ds:schemaRef ds:uri="http://schemas.openxmlformats.org/package/2006/metadata/core-properties"/>
+    <ds:schemaRef ds:uri="http://purl.org/dc/elements/1.1/"/>
+    <ds:schemaRef ds:uri="http://purl.org/dc/terms/"/>
+    <ds:schemaRef ds:uri="http://schemas.microsoft.com/internal/obd"/>
   </ds:schemaRefs>
 </ds:datastoreItem>
 </file>
@@ -20559,20 +20577,15 @@
 </file>
 
 <file path=customXml/itemProps3.xml><?xml version="1.0" encoding="utf-8"?>
-<ds:datastoreItem xmlns:ds="http://schemas.openxmlformats.org/officeDocument/2006/customXml" ds:itemID="{85338F74-B976-4101-955D-1A3C117F4A0E}">
+<ds:datastoreItem xmlns:ds="http://schemas.openxmlformats.org/officeDocument/2006/customXml" ds:itemID="{758FDAC0-319D-4A54-8D8E-1D42CB1F8004}">
   <ds:schemaRefs>
-    <ds:schemaRef ds:uri="http://schemas.microsoft.com/office/2006/metadata/contentType"/>
-    <ds:schemaRef ds:uri="http://schemas.microsoft.com/office/2006/metadata/properties/metaAttributes"/>
-    <ds:schemaRef ds:uri="http://www.w3.org/2001/XMLSchema"/>
-    <ds:schemaRef ds:uri="http://schemas.microsoft.com/office/2006/metadata/properties"/>
-    <ds:schemaRef ds:uri="4053a332-7d8e-488d-aba6-ad6dfa6b0f2d"/>
-    <ds:schemaRef ds:uri="6e4f6676-91ee-47a5-8164-c59c33586ba7"/>
-    <ds:schemaRef ds:uri="http://schemas.microsoft.com/office/2006/documentManagement/types"/>
-    <ds:schemaRef ds:uri="http://schemas.microsoft.com/office/infopath/2007/PartnerControls"/>
-    <ds:schemaRef ds:uri="http://schemas.openxmlformats.org/package/2006/metadata/core-properties"/>
-    <ds:schemaRef ds:uri="http://purl.org/dc/elements/1.1/"/>
-    <ds:schemaRef ds:uri="http://purl.org/dc/terms/"/>
-    <ds:schemaRef ds:uri="http://schemas.microsoft.com/internal/obd"/>
+    <ds:schemaRef ds:uri="http://schemas.microsoft.com/sharepoint/v3/contenttype/forms"/>
   </ds:schemaRefs>
 </ds:datastoreItem>
+</file>
+
+<file path=docMetadata/LabelInfo.xml><?xml version="1.0" encoding="utf-8"?>
+<clbl:labelList xmlns:clbl="http://schemas.microsoft.com/office/2020/mipLabelMetadata">
+  <clbl:label id="{f42aa342-8706-4288-bd11-ebb85995028c}" enabled="1" method="Privileged" siteId="{72f988bf-86f1-41af-91ab-2d7cd011db47}" removed="0"/>
+</clbl:labelList>
 </file>
</xml_diff>